<commit_message>
Add practice exam - Prog 4
</commit_message>
<xml_diff>
--- a/Programming 4/Exam Preparation/Exam Preparation.pptx
+++ b/Programming 4/Exam Preparation/Exam Preparation.pptx
@@ -5,7 +5,7 @@
     <p:sldMasterId id="2147483648" r:id="rId1"/>
   </p:sldMasterIdLst>
   <p:notesMasterIdLst>
-    <p:notesMasterId r:id="rId13"/>
+    <p:notesMasterId r:id="rId14"/>
   </p:notesMasterIdLst>
   <p:sldIdLst>
     <p:sldId id="256" r:id="rId2"/>
@@ -19,6 +19,7 @@
     <p:sldId id="294" r:id="rId10"/>
     <p:sldId id="295" r:id="rId11"/>
     <p:sldId id="296" r:id="rId12"/>
+    <p:sldId id="297" r:id="rId13"/>
   </p:sldIdLst>
   <p:sldSz cx="12192000" cy="6858000"/>
   <p:notesSz cx="6858000" cy="9144000"/>
@@ -218,7 +219,7 @@
           <a:p>
             <a:fld id="{5C15C721-1CBE-9B49-BE99-3A9DF18FA391}" type="datetimeFigureOut">
               <a:rPr lang="en-US" smtClean="0"/>
-              <a:t>6/5/19</a:t>
+              <a:t>6/7/19</a:t>
             </a:fld>
             <a:endParaRPr lang="en-US"/>
           </a:p>
@@ -647,6 +648,16 @@
             </a:r>
           </a:p>
           <a:p>
+            <a:pPr marL="171450" indent="-171450">
+              <a:buFont typeface="Arial" charset="0"/>
+              <a:buChar char="•"/>
+            </a:pPr>
+            <a:r>
+              <a:rPr lang="en-US" dirty="0" smtClean="0"/>
+              <a:t>Ruby</a:t>
+            </a:r>
+          </a:p>
+          <a:p>
             <a:endParaRPr lang="en-US" dirty="0"/>
           </a:p>
         </p:txBody>
@@ -854,6 +865,94 @@
     <p:extLst>
       <p:ext uri="{BB962C8B-B14F-4D97-AF65-F5344CB8AC3E}">
         <p14:creationId xmlns:p14="http://schemas.microsoft.com/office/powerpoint/2010/main" val="682468562"/>
+      </p:ext>
+    </p:extLst>
+  </p:cSld>
+  <p:clrMapOvr>
+    <a:masterClrMapping/>
+  </p:clrMapOvr>
+</p:notes>
+</file>
+
+<file path=ppt/notesSlides/notesSlide12.xml><?xml version="1.0" encoding="utf-8"?>
+<p:notes xmlns:a="http://schemas.openxmlformats.org/drawingml/2006/main" xmlns:r="http://schemas.openxmlformats.org/officeDocument/2006/relationships" xmlns:p="http://schemas.openxmlformats.org/presentationml/2006/main">
+  <p:cSld>
+    <p:spTree>
+      <p:nvGrpSpPr>
+        <p:cNvPr id="1" name=""/>
+        <p:cNvGrpSpPr/>
+        <p:nvPr/>
+      </p:nvGrpSpPr>
+      <p:grpSpPr>
+        <a:xfrm>
+          <a:off x="0" y="0"/>
+          <a:ext cx="0" cy="0"/>
+          <a:chOff x="0" y="0"/>
+          <a:chExt cx="0" cy="0"/>
+        </a:xfrm>
+      </p:grpSpPr>
+      <p:sp>
+        <p:nvSpPr>
+          <p:cNvPr id="2" name="Slide Image Placeholder 1"/>
+          <p:cNvSpPr>
+            <a:spLocks noGrp="1" noRot="1" noChangeAspect="1"/>
+          </p:cNvSpPr>
+          <p:nvPr>
+            <p:ph type="sldImg"/>
+          </p:nvPr>
+        </p:nvSpPr>
+        <p:spPr/>
+      </p:sp>
+      <p:sp>
+        <p:nvSpPr>
+          <p:cNvPr id="3" name="Notes Placeholder 2"/>
+          <p:cNvSpPr>
+            <a:spLocks noGrp="1"/>
+          </p:cNvSpPr>
+          <p:nvPr>
+            <p:ph type="body" idx="1"/>
+          </p:nvPr>
+        </p:nvSpPr>
+        <p:spPr/>
+        <p:txBody>
+          <a:bodyPr/>
+          <a:lstStyle/>
+          <a:p>
+            <a:pPr marL="171450" indent="-171450">
+              <a:buFont typeface="Arial" charset="0"/>
+              <a:buChar char="•"/>
+            </a:pPr>
+            <a:endParaRPr lang="en-US" baseline="0" dirty="0" smtClean="0"/>
+          </a:p>
+        </p:txBody>
+      </p:sp>
+      <p:sp>
+        <p:nvSpPr>
+          <p:cNvPr id="4" name="Slide Number Placeholder 3"/>
+          <p:cNvSpPr>
+            <a:spLocks noGrp="1"/>
+          </p:cNvSpPr>
+          <p:nvPr>
+            <p:ph type="sldNum" sz="quarter" idx="10"/>
+          </p:nvPr>
+        </p:nvSpPr>
+        <p:spPr/>
+        <p:txBody>
+          <a:bodyPr/>
+          <a:lstStyle/>
+          <a:p>
+            <a:fld id="{5C949890-84D1-B346-997E-B43A2CF20212}" type="slidenum">
+              <a:rPr lang="en-US" smtClean="0"/>
+              <a:t>12</a:t>
+            </a:fld>
+            <a:endParaRPr lang="en-US"/>
+          </a:p>
+        </p:txBody>
+      </p:sp>
+    </p:spTree>
+    <p:extLst>
+      <p:ext uri="{BB962C8B-B14F-4D97-AF65-F5344CB8AC3E}">
+        <p14:creationId xmlns:p14="http://schemas.microsoft.com/office/powerpoint/2010/main" val="1580181945"/>
       </p:ext>
     </p:extLst>
   </p:cSld>
@@ -1790,7 +1889,7 @@
           <a:p>
             <a:fld id="{BD4CA122-8521-6D44-9B67-558DC60F8753}" type="datetimeFigureOut">
               <a:rPr lang="en-US" smtClean="0"/>
-              <a:t>6/5/19</a:t>
+              <a:t>6/7/19</a:t>
             </a:fld>
             <a:endParaRPr lang="en-US"/>
           </a:p>
@@ -1960,7 +2059,7 @@
           <a:p>
             <a:fld id="{BD4CA122-8521-6D44-9B67-558DC60F8753}" type="datetimeFigureOut">
               <a:rPr lang="en-US" smtClean="0"/>
-              <a:t>6/5/19</a:t>
+              <a:t>6/7/19</a:t>
             </a:fld>
             <a:endParaRPr lang="en-US"/>
           </a:p>
@@ -2140,7 +2239,7 @@
           <a:p>
             <a:fld id="{BD4CA122-8521-6D44-9B67-558DC60F8753}" type="datetimeFigureOut">
               <a:rPr lang="en-US" smtClean="0"/>
-              <a:t>6/5/19</a:t>
+              <a:t>6/7/19</a:t>
             </a:fld>
             <a:endParaRPr lang="en-US"/>
           </a:p>
@@ -2310,7 +2409,7 @@
           <a:p>
             <a:fld id="{BD4CA122-8521-6D44-9B67-558DC60F8753}" type="datetimeFigureOut">
               <a:rPr lang="en-US" smtClean="0"/>
-              <a:t>6/5/19</a:t>
+              <a:t>6/7/19</a:t>
             </a:fld>
             <a:endParaRPr lang="en-US"/>
           </a:p>
@@ -2556,7 +2655,7 @@
           <a:p>
             <a:fld id="{BD4CA122-8521-6D44-9B67-558DC60F8753}" type="datetimeFigureOut">
               <a:rPr lang="en-US" smtClean="0"/>
-              <a:t>6/5/19</a:t>
+              <a:t>6/7/19</a:t>
             </a:fld>
             <a:endParaRPr lang="en-US"/>
           </a:p>
@@ -2788,7 +2887,7 @@
           <a:p>
             <a:fld id="{BD4CA122-8521-6D44-9B67-558DC60F8753}" type="datetimeFigureOut">
               <a:rPr lang="en-US" smtClean="0"/>
-              <a:t>6/5/19</a:t>
+              <a:t>6/7/19</a:t>
             </a:fld>
             <a:endParaRPr lang="en-US"/>
           </a:p>
@@ -3155,7 +3254,7 @@
           <a:p>
             <a:fld id="{BD4CA122-8521-6D44-9B67-558DC60F8753}" type="datetimeFigureOut">
               <a:rPr lang="en-US" smtClean="0"/>
-              <a:t>6/5/19</a:t>
+              <a:t>6/7/19</a:t>
             </a:fld>
             <a:endParaRPr lang="en-US"/>
           </a:p>
@@ -3273,7 +3372,7 @@
           <a:p>
             <a:fld id="{BD4CA122-8521-6D44-9B67-558DC60F8753}" type="datetimeFigureOut">
               <a:rPr lang="en-US" smtClean="0"/>
-              <a:t>6/5/19</a:t>
+              <a:t>6/7/19</a:t>
             </a:fld>
             <a:endParaRPr lang="en-US"/>
           </a:p>
@@ -3368,7 +3467,7 @@
           <a:p>
             <a:fld id="{BD4CA122-8521-6D44-9B67-558DC60F8753}" type="datetimeFigureOut">
               <a:rPr lang="en-US" smtClean="0"/>
-              <a:t>6/5/19</a:t>
+              <a:t>6/7/19</a:t>
             </a:fld>
             <a:endParaRPr lang="en-US"/>
           </a:p>
@@ -3645,7 +3744,7 @@
           <a:p>
             <a:fld id="{BD4CA122-8521-6D44-9B67-558DC60F8753}" type="datetimeFigureOut">
               <a:rPr lang="en-US" smtClean="0"/>
-              <a:t>6/5/19</a:t>
+              <a:t>6/7/19</a:t>
             </a:fld>
             <a:endParaRPr lang="en-US"/>
           </a:p>
@@ -3898,7 +3997,7 @@
           <a:p>
             <a:fld id="{BD4CA122-8521-6D44-9B67-558DC60F8753}" type="datetimeFigureOut">
               <a:rPr lang="en-US" smtClean="0"/>
-              <a:t>6/5/19</a:t>
+              <a:t>6/7/19</a:t>
             </a:fld>
             <a:endParaRPr lang="en-US"/>
           </a:p>
@@ -4111,7 +4210,7 @@
           <a:p>
             <a:fld id="{BD4CA122-8521-6D44-9B67-558DC60F8753}" type="datetimeFigureOut">
               <a:rPr lang="en-US" smtClean="0"/>
-              <a:t>6/5/19</a:t>
+              <a:t>6/7/19</a:t>
             </a:fld>
             <a:endParaRPr lang="en-US"/>
           </a:p>
@@ -4581,7 +4680,6 @@
               <a:rPr lang="en-US" sz="3800" b="1" dirty="0" smtClean="0"/>
               <a:t>Exam Preparation</a:t>
             </a:r>
-            <a:endParaRPr lang="en-US" sz="3800" b="1" dirty="0" smtClean="0"/>
           </a:p>
           <a:p>
             <a:pPr algn="ctr"/>
@@ -4706,7 +4804,6 @@
               <a:rPr lang="en-US" sz="3800" b="1" dirty="0" smtClean="0"/>
               <a:t>Iterators and generators</a:t>
             </a:r>
-            <a:endParaRPr lang="en-US" sz="3800" b="1" dirty="0" smtClean="0"/>
           </a:p>
           <a:p>
             <a:endParaRPr lang="en-US" sz="3800" b="1" dirty="0"/>
@@ -4824,7 +4921,6 @@
               <a:rPr lang="en-US" sz="3800" b="1" dirty="0" smtClean="0"/>
               <a:t>Exceptions</a:t>
             </a:r>
-            <a:endParaRPr lang="en-US" sz="3800" b="1" dirty="0" smtClean="0"/>
           </a:p>
           <a:p>
             <a:endParaRPr lang="en-US" sz="3800" b="1" dirty="0"/>
@@ -4845,6 +4941,124 @@
     <p:extLst>
       <p:ext uri="{BB962C8B-B14F-4D97-AF65-F5344CB8AC3E}">
         <p14:creationId xmlns:p14="http://schemas.microsoft.com/office/powerpoint/2010/main" val="778306977"/>
+      </p:ext>
+    </p:extLst>
+  </p:cSld>
+  <p:clrMapOvr>
+    <a:masterClrMapping/>
+  </p:clrMapOvr>
+  <p:timing>
+    <p:tnLst>
+      <p:par>
+        <p:cTn id="1" dur="indefinite" restart="never" nodeType="tmRoot"/>
+      </p:par>
+    </p:tnLst>
+  </p:timing>
+</p:sld>
+</file>
+
+<file path=ppt/slides/slide12.xml><?xml version="1.0" encoding="utf-8"?>
+<p:sld xmlns:a="http://schemas.openxmlformats.org/drawingml/2006/main" xmlns:r="http://schemas.openxmlformats.org/officeDocument/2006/relationships" xmlns:p="http://schemas.openxmlformats.org/presentationml/2006/main">
+  <p:cSld>
+    <p:bg>
+      <p:bgPr>
+        <a:solidFill>
+          <a:schemeClr val="accent5">
+            <a:lumMod val="60000"/>
+            <a:lumOff val="40000"/>
+          </a:schemeClr>
+        </a:solidFill>
+        <a:effectLst/>
+      </p:bgPr>
+    </p:bg>
+    <p:spTree>
+      <p:nvGrpSpPr>
+        <p:cNvPr id="1" name=""/>
+        <p:cNvGrpSpPr/>
+        <p:nvPr/>
+      </p:nvGrpSpPr>
+      <p:grpSpPr>
+        <a:xfrm>
+          <a:off x="0" y="0"/>
+          <a:ext cx="0" cy="0"/>
+          <a:chOff x="0" y="0"/>
+          <a:chExt cx="0" cy="0"/>
+        </a:xfrm>
+      </p:grpSpPr>
+      <p:sp>
+        <p:nvSpPr>
+          <p:cNvPr id="9" name="Slide Number Placeholder 8"/>
+          <p:cNvSpPr>
+            <a:spLocks noGrp="1"/>
+          </p:cNvSpPr>
+          <p:nvPr>
+            <p:ph type="sldNum" sz="quarter" idx="12"/>
+          </p:nvPr>
+        </p:nvSpPr>
+        <p:spPr/>
+        <p:txBody>
+          <a:bodyPr/>
+          <a:lstStyle/>
+          <a:p>
+            <a:fld id="{B822FDE6-25CA-0444-94EE-C6FC8C5EFEB8}" type="slidenum">
+              <a:rPr lang="en-US" smtClean="0"/>
+              <a:t>12</a:t>
+            </a:fld>
+            <a:endParaRPr lang="en-US"/>
+          </a:p>
+        </p:txBody>
+      </p:sp>
+      <p:sp>
+        <p:nvSpPr>
+          <p:cNvPr id="6" name="Rectangle 5"/>
+          <p:cNvSpPr/>
+          <p:nvPr/>
+        </p:nvSpPr>
+        <p:spPr>
+          <a:xfrm>
+            <a:off x="0" y="1299607"/>
+            <a:ext cx="12192000" cy="1646605"/>
+          </a:xfrm>
+          <a:prstGeom prst="rect">
+            <a:avLst/>
+          </a:prstGeom>
+          <a:noFill/>
+        </p:spPr>
+        <p:txBody>
+          <a:bodyPr wrap="square" lIns="91440" tIns="45720" rIns="91440" bIns="45720">
+            <a:spAutoFit/>
+          </a:bodyPr>
+          <a:lstStyle/>
+          <a:p>
+            <a:r>
+              <a:rPr lang="en-US" sz="3800" dirty="0" smtClean="0"/>
+              <a:t>	</a:t>
+            </a:r>
+            <a:r>
+              <a:rPr lang="en-US" sz="3800" b="1" dirty="0" smtClean="0"/>
+              <a:t>Ruby</a:t>
+            </a:r>
+            <a:endParaRPr lang="en-US" sz="3800" b="1" dirty="0" smtClean="0"/>
+          </a:p>
+          <a:p>
+            <a:endParaRPr lang="en-US" sz="3800" b="1" dirty="0"/>
+          </a:p>
+          <a:p>
+            <a:pPr marL="1485900" lvl="2" indent="-571500">
+              <a:buFont typeface="Arial" charset="0"/>
+              <a:buChar char="•"/>
+            </a:pPr>
+            <a:r>
+              <a:rPr lang="en-US" sz="2500" dirty="0" smtClean="0"/>
+              <a:t>Pointers</a:t>
+            </a:r>
+          </a:p>
+        </p:txBody>
+      </p:sp>
+    </p:spTree>
+    <p:extLst>
+      <p:ext uri="{BB962C8B-B14F-4D97-AF65-F5344CB8AC3E}">
+        <p14:creationId xmlns:p14="http://schemas.microsoft.com/office/powerpoint/2010/main" val="363353138"/>
       </p:ext>
     </p:extLst>
   </p:cSld>
@@ -4942,7 +5156,6 @@
               <a:rPr lang="en-US" sz="3800" b="1" dirty="0" smtClean="0"/>
               <a:t>Pointers</a:t>
             </a:r>
-            <a:endParaRPr lang="en-US" sz="3800" b="1" dirty="0" smtClean="0"/>
           </a:p>
           <a:p>
             <a:endParaRPr lang="en-US" sz="3800" b="1" dirty="0"/>
@@ -5100,7 +5313,6 @@
               <a:rPr lang="en-US" sz="3800" b="1" dirty="0" smtClean="0"/>
               <a:t>Linked Lists</a:t>
             </a:r>
-            <a:endParaRPr lang="en-US" sz="3800" b="1" dirty="0" smtClean="0"/>
           </a:p>
           <a:p>
             <a:endParaRPr lang="en-US" sz="3800" b="1" dirty="0"/>
@@ -5218,7 +5430,6 @@
               <a:rPr lang="en-US" sz="3800" b="1" dirty="0" smtClean="0"/>
               <a:t>Prolog</a:t>
             </a:r>
-            <a:endParaRPr lang="en-US" sz="3800" b="1" dirty="0" smtClean="0"/>
           </a:p>
           <a:p>
             <a:endParaRPr lang="en-US" sz="3800" b="1" dirty="0"/>
@@ -5336,7 +5547,6 @@
               <a:rPr lang="en-US" sz="3800" b="1" dirty="0" smtClean="0"/>
               <a:t>Inheritance</a:t>
             </a:r>
-            <a:endParaRPr lang="en-US" sz="3800" b="1" dirty="0" smtClean="0"/>
           </a:p>
           <a:p>
             <a:endParaRPr lang="en-US" sz="3800" b="1" dirty="0"/>
@@ -5454,7 +5664,6 @@
               <a:rPr lang="en-US" sz="3800" b="1" dirty="0" smtClean="0"/>
               <a:t>Finite State Machine (FSM)</a:t>
             </a:r>
-            <a:endParaRPr lang="en-US" sz="3800" b="1" dirty="0" smtClean="0"/>
           </a:p>
           <a:p>
             <a:endParaRPr lang="en-US" sz="3800" b="1" dirty="0"/>
@@ -5572,7 +5781,6 @@
               <a:rPr lang="en-US" sz="3800" b="1" dirty="0" smtClean="0"/>
               <a:t>Optimization</a:t>
             </a:r>
-            <a:endParaRPr lang="en-US" sz="3800" b="1" dirty="0" smtClean="0"/>
           </a:p>
           <a:p>
             <a:endParaRPr lang="en-US" sz="3800" b="1" dirty="0"/>
@@ -5690,7 +5898,6 @@
               <a:rPr lang="en-US" sz="3800" b="1" dirty="0" smtClean="0"/>
               <a:t>List comprehensions</a:t>
             </a:r>
-            <a:endParaRPr lang="en-US" sz="3800" b="1" dirty="0" smtClean="0"/>
           </a:p>
           <a:p>
             <a:endParaRPr lang="en-US" sz="3800" b="1" dirty="0"/>
@@ -5808,7 +6015,6 @@
               <a:rPr lang="en-US" sz="3800" b="1" dirty="0" smtClean="0"/>
               <a:t>Lambda</a:t>
             </a:r>
-            <a:endParaRPr lang="en-US" sz="3800" b="1" dirty="0" smtClean="0"/>
           </a:p>
           <a:p>
             <a:endParaRPr lang="en-US" sz="3800" b="1" dirty="0"/>

</xml_diff>

<commit_message>
Finish Prog 4 - exam practice
</commit_message>
<xml_diff>
--- a/Programming 4/Exam Preparation/Exam Preparation.pptx
+++ b/Programming 4/Exam Preparation/Exam Preparation.pptx
@@ -5,21 +5,22 @@
     <p:sldMasterId id="2147483648" r:id="rId1"/>
   </p:sldMasterIdLst>
   <p:notesMasterIdLst>
-    <p:notesMasterId r:id="rId14"/>
+    <p:notesMasterId r:id="rId15"/>
   </p:notesMasterIdLst>
   <p:sldIdLst>
     <p:sldId id="256" r:id="rId2"/>
     <p:sldId id="287" r:id="rId3"/>
     <p:sldId id="288" r:id="rId4"/>
     <p:sldId id="289" r:id="rId5"/>
-    <p:sldId id="290" r:id="rId6"/>
-    <p:sldId id="291" r:id="rId7"/>
-    <p:sldId id="292" r:id="rId8"/>
+    <p:sldId id="298" r:id="rId6"/>
+    <p:sldId id="290" r:id="rId7"/>
+    <p:sldId id="291" r:id="rId8"/>
     <p:sldId id="293" r:id="rId9"/>
     <p:sldId id="294" r:id="rId10"/>
     <p:sldId id="295" r:id="rId11"/>
-    <p:sldId id="296" r:id="rId12"/>
-    <p:sldId id="297" r:id="rId13"/>
+    <p:sldId id="299" r:id="rId12"/>
+    <p:sldId id="296" r:id="rId13"/>
+    <p:sldId id="297" r:id="rId14"/>
   </p:sldIdLst>
   <p:sldSz cx="12192000" cy="6858000"/>
   <p:notesSz cx="6858000" cy="9144000"/>
@@ -219,7 +220,7 @@
           <a:p>
             <a:fld id="{5C15C721-1CBE-9B49-BE99-3A9DF18FA391}" type="datetimeFigureOut">
               <a:rPr lang="en-US" smtClean="0"/>
-              <a:t>6/7/19</a:t>
+              <a:t>6/10/19</a:t>
             </a:fld>
             <a:endParaRPr lang="en-US"/>
           </a:p>
@@ -537,8 +538,9 @@
             </a:pPr>
             <a:r>
               <a:rPr lang="en-US" dirty="0" smtClean="0"/>
-              <a:t>Overview</a:t>
-            </a:r>
+              <a:t>In the exam, you will get questions about the following:</a:t>
+            </a:r>
+            <a:endParaRPr lang="en-US" dirty="0" smtClean="0"/>
           </a:p>
           <a:p>
             <a:pPr marL="171450" indent="-171450">
@@ -864,7 +866,7 @@
     </p:spTree>
     <p:extLst>
       <p:ext uri="{BB962C8B-B14F-4D97-AF65-F5344CB8AC3E}">
-        <p14:creationId xmlns:p14="http://schemas.microsoft.com/office/powerpoint/2010/main" val="682468562"/>
+        <p14:creationId xmlns:p14="http://schemas.microsoft.com/office/powerpoint/2010/main" val="1262586899"/>
       </p:ext>
     </p:extLst>
   </p:cSld>
@@ -944,6 +946,94 @@
             <a:fld id="{5C949890-84D1-B346-997E-B43A2CF20212}" type="slidenum">
               <a:rPr lang="en-US" smtClean="0"/>
               <a:t>12</a:t>
+            </a:fld>
+            <a:endParaRPr lang="en-US"/>
+          </a:p>
+        </p:txBody>
+      </p:sp>
+    </p:spTree>
+    <p:extLst>
+      <p:ext uri="{BB962C8B-B14F-4D97-AF65-F5344CB8AC3E}">
+        <p14:creationId xmlns:p14="http://schemas.microsoft.com/office/powerpoint/2010/main" val="682468562"/>
+      </p:ext>
+    </p:extLst>
+  </p:cSld>
+  <p:clrMapOvr>
+    <a:masterClrMapping/>
+  </p:clrMapOvr>
+</p:notes>
+</file>
+
+<file path=ppt/notesSlides/notesSlide13.xml><?xml version="1.0" encoding="utf-8"?>
+<p:notes xmlns:a="http://schemas.openxmlformats.org/drawingml/2006/main" xmlns:r="http://schemas.openxmlformats.org/officeDocument/2006/relationships" xmlns:p="http://schemas.openxmlformats.org/presentationml/2006/main">
+  <p:cSld>
+    <p:spTree>
+      <p:nvGrpSpPr>
+        <p:cNvPr id="1" name=""/>
+        <p:cNvGrpSpPr/>
+        <p:nvPr/>
+      </p:nvGrpSpPr>
+      <p:grpSpPr>
+        <a:xfrm>
+          <a:off x="0" y="0"/>
+          <a:ext cx="0" cy="0"/>
+          <a:chOff x="0" y="0"/>
+          <a:chExt cx="0" cy="0"/>
+        </a:xfrm>
+      </p:grpSpPr>
+      <p:sp>
+        <p:nvSpPr>
+          <p:cNvPr id="2" name="Slide Image Placeholder 1"/>
+          <p:cNvSpPr>
+            <a:spLocks noGrp="1" noRot="1" noChangeAspect="1"/>
+          </p:cNvSpPr>
+          <p:nvPr>
+            <p:ph type="sldImg"/>
+          </p:nvPr>
+        </p:nvSpPr>
+        <p:spPr/>
+      </p:sp>
+      <p:sp>
+        <p:nvSpPr>
+          <p:cNvPr id="3" name="Notes Placeholder 2"/>
+          <p:cNvSpPr>
+            <a:spLocks noGrp="1"/>
+          </p:cNvSpPr>
+          <p:nvPr>
+            <p:ph type="body" idx="1"/>
+          </p:nvPr>
+        </p:nvSpPr>
+        <p:spPr/>
+        <p:txBody>
+          <a:bodyPr/>
+          <a:lstStyle/>
+          <a:p>
+            <a:pPr marL="171450" indent="-171450">
+              <a:buFont typeface="Arial" charset="0"/>
+              <a:buChar char="•"/>
+            </a:pPr>
+            <a:endParaRPr lang="en-US" baseline="0" dirty="0" smtClean="0"/>
+          </a:p>
+        </p:txBody>
+      </p:sp>
+      <p:sp>
+        <p:nvSpPr>
+          <p:cNvPr id="4" name="Slide Number Placeholder 3"/>
+          <p:cNvSpPr>
+            <a:spLocks noGrp="1"/>
+          </p:cNvSpPr>
+          <p:nvPr>
+            <p:ph type="sldNum" sz="quarter" idx="10"/>
+          </p:nvPr>
+        </p:nvSpPr>
+        <p:spPr/>
+        <p:txBody>
+          <a:bodyPr/>
+          <a:lstStyle/>
+          <a:p>
+            <a:fld id="{5C949890-84D1-B346-997E-B43A2CF20212}" type="slidenum">
+              <a:rPr lang="en-US" smtClean="0"/>
+              <a:t>13</a:t>
             </a:fld>
             <a:endParaRPr lang="en-US"/>
           </a:p>
@@ -1032,7 +1122,11 @@
             </a:pPr>
             <a:r>
               <a:rPr lang="en-US" baseline="0" dirty="0" smtClean="0"/>
-              <a:t>What are the values of *aPtr, *bPtr, *cPtr? =&gt; All 45</a:t>
+              <a:t>What are the values of </a:t>
+            </a:r>
+            <a:r>
+              <a:rPr lang="en-US" b="1" baseline="0" dirty="0" smtClean="0"/>
+              <a:t>*aPtr, *bPtr, *cPtr? =&gt; All 45</a:t>
             </a:r>
           </a:p>
           <a:p>
@@ -1096,13 +1190,8 @@
             </a:r>
             <a:r>
               <a:rPr lang="en-US" baseline="0" dirty="0" smtClean="0"/>
-              <a:t>Person and telling John to move. Actually, John is a pointer to a Person in memory. </a:t>
-            </a:r>
-            <a:r>
-              <a:rPr lang="en-US" baseline="0" smtClean="0"/>
-              <a:t>John ho</a:t>
-            </a:r>
-            <a:endParaRPr lang="en-US" baseline="0" dirty="0" smtClean="0"/>
+              <a:t>Person and telling John to move. Actually, John is a pointer to a Person in memory. John just holds an address. John is not a Person.</a:t>
+            </a:r>
           </a:p>
         </p:txBody>
       </p:sp>
@@ -1396,7 +1485,7 @@
     </p:spTree>
     <p:extLst>
       <p:ext uri="{BB962C8B-B14F-4D97-AF65-F5344CB8AC3E}">
-        <p14:creationId xmlns:p14="http://schemas.microsoft.com/office/powerpoint/2010/main" val="1200451045"/>
+        <p14:creationId xmlns:p14="http://schemas.microsoft.com/office/powerpoint/2010/main" val="808450983"/>
       </p:ext>
     </p:extLst>
   </p:cSld>
@@ -1484,7 +1573,7 @@
     </p:spTree>
     <p:extLst>
       <p:ext uri="{BB962C8B-B14F-4D97-AF65-F5344CB8AC3E}">
-        <p14:creationId xmlns:p14="http://schemas.microsoft.com/office/powerpoint/2010/main" val="213408094"/>
+        <p14:creationId xmlns:p14="http://schemas.microsoft.com/office/powerpoint/2010/main" val="1200451045"/>
       </p:ext>
     </p:extLst>
   </p:cSld>
@@ -1572,7 +1661,7 @@
     </p:spTree>
     <p:extLst>
       <p:ext uri="{BB962C8B-B14F-4D97-AF65-F5344CB8AC3E}">
-        <p14:creationId xmlns:p14="http://schemas.microsoft.com/office/powerpoint/2010/main" val="625240534"/>
+        <p14:creationId xmlns:p14="http://schemas.microsoft.com/office/powerpoint/2010/main" val="213408094"/>
       </p:ext>
     </p:extLst>
   </p:cSld>
@@ -1889,7 +1978,7 @@
           <a:p>
             <a:fld id="{BD4CA122-8521-6D44-9B67-558DC60F8753}" type="datetimeFigureOut">
               <a:rPr lang="en-US" smtClean="0"/>
-              <a:t>6/7/19</a:t>
+              <a:t>6/10/19</a:t>
             </a:fld>
             <a:endParaRPr lang="en-US"/>
           </a:p>
@@ -2059,7 +2148,7 @@
           <a:p>
             <a:fld id="{BD4CA122-8521-6D44-9B67-558DC60F8753}" type="datetimeFigureOut">
               <a:rPr lang="en-US" smtClean="0"/>
-              <a:t>6/7/19</a:t>
+              <a:t>6/10/19</a:t>
             </a:fld>
             <a:endParaRPr lang="en-US"/>
           </a:p>
@@ -2239,7 +2328,7 @@
           <a:p>
             <a:fld id="{BD4CA122-8521-6D44-9B67-558DC60F8753}" type="datetimeFigureOut">
               <a:rPr lang="en-US" smtClean="0"/>
-              <a:t>6/7/19</a:t>
+              <a:t>6/10/19</a:t>
             </a:fld>
             <a:endParaRPr lang="en-US"/>
           </a:p>
@@ -2409,7 +2498,7 @@
           <a:p>
             <a:fld id="{BD4CA122-8521-6D44-9B67-558DC60F8753}" type="datetimeFigureOut">
               <a:rPr lang="en-US" smtClean="0"/>
-              <a:t>6/7/19</a:t>
+              <a:t>6/10/19</a:t>
             </a:fld>
             <a:endParaRPr lang="en-US"/>
           </a:p>
@@ -2655,7 +2744,7 @@
           <a:p>
             <a:fld id="{BD4CA122-8521-6D44-9B67-558DC60F8753}" type="datetimeFigureOut">
               <a:rPr lang="en-US" smtClean="0"/>
-              <a:t>6/7/19</a:t>
+              <a:t>6/10/19</a:t>
             </a:fld>
             <a:endParaRPr lang="en-US"/>
           </a:p>
@@ -2887,7 +2976,7 @@
           <a:p>
             <a:fld id="{BD4CA122-8521-6D44-9B67-558DC60F8753}" type="datetimeFigureOut">
               <a:rPr lang="en-US" smtClean="0"/>
-              <a:t>6/7/19</a:t>
+              <a:t>6/10/19</a:t>
             </a:fld>
             <a:endParaRPr lang="en-US"/>
           </a:p>
@@ -3254,7 +3343,7 @@
           <a:p>
             <a:fld id="{BD4CA122-8521-6D44-9B67-558DC60F8753}" type="datetimeFigureOut">
               <a:rPr lang="en-US" smtClean="0"/>
-              <a:t>6/7/19</a:t>
+              <a:t>6/10/19</a:t>
             </a:fld>
             <a:endParaRPr lang="en-US"/>
           </a:p>
@@ -3372,7 +3461,7 @@
           <a:p>
             <a:fld id="{BD4CA122-8521-6D44-9B67-558DC60F8753}" type="datetimeFigureOut">
               <a:rPr lang="en-US" smtClean="0"/>
-              <a:t>6/7/19</a:t>
+              <a:t>6/10/19</a:t>
             </a:fld>
             <a:endParaRPr lang="en-US"/>
           </a:p>
@@ -3467,7 +3556,7 @@
           <a:p>
             <a:fld id="{BD4CA122-8521-6D44-9B67-558DC60F8753}" type="datetimeFigureOut">
               <a:rPr lang="en-US" smtClean="0"/>
-              <a:t>6/7/19</a:t>
+              <a:t>6/10/19</a:t>
             </a:fld>
             <a:endParaRPr lang="en-US"/>
           </a:p>
@@ -3744,7 +3833,7 @@
           <a:p>
             <a:fld id="{BD4CA122-8521-6D44-9B67-558DC60F8753}" type="datetimeFigureOut">
               <a:rPr lang="en-US" smtClean="0"/>
-              <a:t>6/7/19</a:t>
+              <a:t>6/10/19</a:t>
             </a:fld>
             <a:endParaRPr lang="en-US"/>
           </a:p>
@@ -3997,7 +4086,7 @@
           <a:p>
             <a:fld id="{BD4CA122-8521-6D44-9B67-558DC60F8753}" type="datetimeFigureOut">
               <a:rPr lang="en-US" smtClean="0"/>
-              <a:t>6/7/19</a:t>
+              <a:t>6/10/19</a:t>
             </a:fld>
             <a:endParaRPr lang="en-US"/>
           </a:p>
@@ -4210,7 +4299,7 @@
           <a:p>
             <a:fld id="{BD4CA122-8521-6D44-9B67-558DC60F8753}" type="datetimeFigureOut">
               <a:rPr lang="en-US" smtClean="0"/>
-              <a:t>6/7/19</a:t>
+              <a:t>6/10/19</a:t>
             </a:fld>
             <a:endParaRPr lang="en-US"/>
           </a:p>
@@ -4651,28 +4740,19 @@
             <a:pPr algn="ctr"/>
             <a:r>
               <a:rPr lang="en-US" sz="3800" b="1" dirty="0" smtClean="0"/>
-              <a:t>Programming 4 </a:t>
-            </a:r>
-            <a:r>
-              <a:rPr lang="en-US" sz="3800" b="1" dirty="0"/>
-              <a:t>- Intermediate Architecture </a:t>
-            </a:r>
+              <a:t>Programming 4 - Intermediate Architecture </a:t>
+            </a:r>
+          </a:p>
+          <a:p>
+            <a:pPr algn="ctr"/>
+            <a:r>
+              <a:rPr lang="en-US" sz="3800" b="1" dirty="0" smtClean="0"/>
+              <a:t>and Algorithms</a:t>
+            </a:r>
+          </a:p>
+          <a:p>
+            <a:pPr algn="ctr"/>
             <a:endParaRPr lang="en-US" sz="3800" b="1" dirty="0" smtClean="0"/>
-          </a:p>
-          <a:p>
-            <a:pPr algn="ctr"/>
-            <a:r>
-              <a:rPr lang="en-US" sz="3800" b="1" dirty="0" smtClean="0"/>
-              <a:t>and </a:t>
-            </a:r>
-            <a:r>
-              <a:rPr lang="en-US" sz="3800" b="1" dirty="0"/>
-              <a:t>Algorithms</a:t>
-            </a:r>
-          </a:p>
-          <a:p>
-            <a:pPr algn="ctr"/>
-            <a:endParaRPr lang="en-US" sz="3800" b="1" dirty="0"/>
           </a:p>
           <a:p>
             <a:pPr algn="ctr"/>
@@ -4783,7 +4863,7 @@
         <p:spPr>
           <a:xfrm>
             <a:off x="0" y="1299607"/>
-            <a:ext cx="12192000" cy="1646605"/>
+            <a:ext cx="12192000" cy="2031325"/>
           </a:xfrm>
           <a:prstGeom prst="rect">
             <a:avLst/>
@@ -4802,8 +4882,9 @@
             </a:r>
             <a:r>
               <a:rPr lang="en-US" sz="3800" b="1" dirty="0" smtClean="0"/>
-              <a:t>Iterators and generators</a:t>
-            </a:r>
+              <a:t>Iterators</a:t>
+            </a:r>
+            <a:endParaRPr lang="en-US" sz="3800" b="1" dirty="0" smtClean="0"/>
           </a:p>
           <a:p>
             <a:endParaRPr lang="en-US" sz="3800" b="1" dirty="0"/>
@@ -4815,11 +4896,64 @@
             </a:pPr>
             <a:r>
               <a:rPr lang="en-US" sz="2500" dirty="0" smtClean="0"/>
-              <a:t>Pointers</a:t>
-            </a:r>
-          </a:p>
-        </p:txBody>
-      </p:sp>
+              <a:t>What is an iterator</a:t>
+            </a:r>
+            <a:r>
+              <a:rPr lang="en-US" sz="2500" dirty="0" smtClean="0"/>
+              <a:t>?</a:t>
+            </a:r>
+          </a:p>
+          <a:p>
+            <a:pPr marL="1485900" lvl="2" indent="-571500">
+              <a:buFont typeface="Arial" charset="0"/>
+              <a:buChar char="•"/>
+            </a:pPr>
+            <a:r>
+              <a:rPr lang="en-US" sz="2500" dirty="0" smtClean="0"/>
+              <a:t>Write </a:t>
+            </a:r>
+            <a:r>
+              <a:rPr lang="en-US" sz="2500" b="1" i="1" dirty="0" smtClean="0"/>
+              <a:t>__next__ </a:t>
+            </a:r>
+            <a:r>
+              <a:rPr lang="en-US" sz="2500" dirty="0" smtClean="0"/>
+              <a:t>code to get the desired output</a:t>
+            </a:r>
+            <a:endParaRPr lang="en-US" sz="2500" dirty="0" smtClean="0"/>
+          </a:p>
+        </p:txBody>
+      </p:sp>
+      <p:pic>
+        <p:nvPicPr>
+          <p:cNvPr id="3" name="Picture 2"/>
+          <p:cNvPicPr>
+            <a:picLocks noChangeAspect="1"/>
+          </p:cNvPicPr>
+          <p:nvPr/>
+        </p:nvPicPr>
+        <p:blipFill>
+          <a:blip r:embed="rId3">
+            <a:extLst>
+              <a:ext uri="{28A0092B-C50C-407E-A947-70E740481C1C}">
+                <a14:useLocalDpi xmlns:a14="http://schemas.microsoft.com/office/drawing/2010/main" val="0"/>
+              </a:ext>
+            </a:extLst>
+          </a:blip>
+          <a:stretch>
+            <a:fillRect/>
+          </a:stretch>
+        </p:blipFill>
+        <p:spPr>
+          <a:xfrm>
+            <a:off x="7914761" y="1972533"/>
+            <a:ext cx="3756189" cy="2985959"/>
+          </a:xfrm>
+          <a:prstGeom prst="rect">
+            <a:avLst/>
+          </a:prstGeom>
+        </p:spPr>
+      </p:pic>
     </p:spTree>
     <p:extLst>
       <p:ext uri="{BB962C8B-B14F-4D97-AF65-F5344CB8AC3E}">
@@ -4900,7 +5034,7 @@
         <p:spPr>
           <a:xfrm>
             <a:off x="0" y="1299607"/>
-            <a:ext cx="12192000" cy="1646605"/>
+            <a:ext cx="12192000" cy="2031325"/>
           </a:xfrm>
           <a:prstGeom prst="rect">
             <a:avLst/>
@@ -4919,8 +5053,9 @@
             </a:r>
             <a:r>
               <a:rPr lang="en-US" sz="3800" b="1" dirty="0" smtClean="0"/>
-              <a:t>Exceptions</a:t>
-            </a:r>
+              <a:t>Generators</a:t>
+            </a:r>
+            <a:endParaRPr lang="en-US" sz="3800" b="1" dirty="0" smtClean="0"/>
           </a:p>
           <a:p>
             <a:endParaRPr lang="en-US" sz="3800" b="1" dirty="0"/>
@@ -4932,15 +5067,68 @@
             </a:pPr>
             <a:r>
               <a:rPr lang="en-US" sz="2500" dirty="0" smtClean="0"/>
-              <a:t>Pointers</a:t>
-            </a:r>
-          </a:p>
-        </p:txBody>
-      </p:sp>
+              <a:t>What is an </a:t>
+            </a:r>
+            <a:r>
+              <a:rPr lang="en-US" sz="2500" dirty="0" smtClean="0"/>
+              <a:t>generator?</a:t>
+            </a:r>
+          </a:p>
+          <a:p>
+            <a:pPr marL="1485900" lvl="2" indent="-571500">
+              <a:buFont typeface="Arial" charset="0"/>
+              <a:buChar char="•"/>
+            </a:pPr>
+            <a:r>
+              <a:rPr lang="en-US" sz="2500" dirty="0" smtClean="0"/>
+              <a:t>Write </a:t>
+            </a:r>
+            <a:r>
+              <a:rPr lang="en-US" sz="2500" b="1" i="1" dirty="0" smtClean="0"/>
+              <a:t>count_to_ten(min, max) </a:t>
+            </a:r>
+            <a:r>
+              <a:rPr lang="en-US" sz="2500" dirty="0" smtClean="0"/>
+              <a:t>code to get the desired output</a:t>
+            </a:r>
+            <a:endParaRPr lang="en-US" sz="2500" dirty="0" smtClean="0"/>
+          </a:p>
+        </p:txBody>
+      </p:sp>
+      <p:pic>
+        <p:nvPicPr>
+          <p:cNvPr id="2" name="Picture 1"/>
+          <p:cNvPicPr>
+            <a:picLocks noChangeAspect="1"/>
+          </p:cNvPicPr>
+          <p:nvPr/>
+        </p:nvPicPr>
+        <p:blipFill>
+          <a:blip r:embed="rId3">
+            <a:extLst>
+              <a:ext uri="{28A0092B-C50C-407E-A947-70E740481C1C}">
+                <a14:useLocalDpi xmlns:a14="http://schemas.microsoft.com/office/drawing/2010/main" val="0"/>
+              </a:ext>
+            </a:extLst>
+          </a:blip>
+          <a:stretch>
+            <a:fillRect/>
+          </a:stretch>
+        </p:blipFill>
+        <p:spPr>
+          <a:xfrm>
+            <a:off x="3403600" y="4005441"/>
+            <a:ext cx="5207000" cy="1676400"/>
+          </a:xfrm>
+          <a:prstGeom prst="rect">
+            <a:avLst/>
+          </a:prstGeom>
+        </p:spPr>
+      </p:pic>
     </p:spTree>
     <p:extLst>
       <p:ext uri="{BB962C8B-B14F-4D97-AF65-F5344CB8AC3E}">
-        <p14:creationId xmlns:p14="http://schemas.microsoft.com/office/powerpoint/2010/main" val="778306977"/>
+        <p14:creationId xmlns:p14="http://schemas.microsoft.com/office/powerpoint/2010/main" val="441020328"/>
       </p:ext>
     </p:extLst>
   </p:cSld>
@@ -5017,6 +5205,163 @@
         <p:spPr>
           <a:xfrm>
             <a:off x="0" y="1299607"/>
+            <a:ext cx="12192000" cy="2877711"/>
+          </a:xfrm>
+          <a:prstGeom prst="rect">
+            <a:avLst/>
+          </a:prstGeom>
+          <a:noFill/>
+        </p:spPr>
+        <p:txBody>
+          <a:bodyPr wrap="square" lIns="91440" tIns="45720" rIns="91440" bIns="45720">
+            <a:spAutoFit/>
+          </a:bodyPr>
+          <a:lstStyle/>
+          <a:p>
+            <a:r>
+              <a:rPr lang="en-US" sz="3800" dirty="0" smtClean="0"/>
+              <a:t>	</a:t>
+            </a:r>
+            <a:r>
+              <a:rPr lang="en-US" sz="3800" b="1" dirty="0" smtClean="0"/>
+              <a:t>Exceptions</a:t>
+            </a:r>
+          </a:p>
+          <a:p>
+            <a:endParaRPr lang="en-US" sz="3800" b="1" dirty="0"/>
+          </a:p>
+          <a:p>
+            <a:pPr marL="1485900" lvl="2" indent="-571500">
+              <a:buFont typeface="Arial" charset="0"/>
+              <a:buChar char="•"/>
+            </a:pPr>
+            <a:r>
+              <a:rPr lang="en-US" sz="2500" dirty="0" smtClean="0"/>
+              <a:t>Identify common exceptions:</a:t>
+            </a:r>
+          </a:p>
+          <a:p>
+            <a:pPr marL="1943100" lvl="3" indent="-571500">
+              <a:buFont typeface="Arial" charset="0"/>
+              <a:buChar char="•"/>
+            </a:pPr>
+            <a:r>
+              <a:rPr lang="en-US" sz="2000" dirty="0" smtClean="0"/>
+              <a:t>MissingMemberException</a:t>
+            </a:r>
+          </a:p>
+          <a:p>
+            <a:pPr marL="1943100" lvl="3" indent="-571500">
+              <a:buFont typeface="Arial" charset="0"/>
+              <a:buChar char="•"/>
+            </a:pPr>
+            <a:r>
+              <a:rPr lang="en-US" sz="2000" dirty="0" smtClean="0"/>
+              <a:t>OverflowException</a:t>
+            </a:r>
+          </a:p>
+          <a:p>
+            <a:pPr marL="1943100" lvl="3" indent="-571500">
+              <a:buFont typeface="Arial" charset="0"/>
+              <a:buChar char="•"/>
+            </a:pPr>
+            <a:r>
+              <a:rPr lang="en-US" sz="2000" dirty="0" smtClean="0"/>
+              <a:t>StackOverflowException</a:t>
+            </a:r>
+          </a:p>
+          <a:p>
+            <a:pPr marL="1943100" lvl="3" indent="-571500">
+              <a:buFont typeface="Arial" charset="0"/>
+              <a:buChar char="•"/>
+            </a:pPr>
+            <a:r>
+              <a:rPr lang="en-US" sz="2000" dirty="0" smtClean="0"/>
+              <a:t>NotImplementedException</a:t>
+            </a:r>
+          </a:p>
+        </p:txBody>
+      </p:sp>
+    </p:spTree>
+    <p:extLst>
+      <p:ext uri="{BB962C8B-B14F-4D97-AF65-F5344CB8AC3E}">
+        <p14:creationId xmlns:p14="http://schemas.microsoft.com/office/powerpoint/2010/main" val="778306977"/>
+      </p:ext>
+    </p:extLst>
+  </p:cSld>
+  <p:clrMapOvr>
+    <a:masterClrMapping/>
+  </p:clrMapOvr>
+  <p:timing>
+    <p:tnLst>
+      <p:par>
+        <p:cTn id="1" dur="indefinite" restart="never" nodeType="tmRoot"/>
+      </p:par>
+    </p:tnLst>
+  </p:timing>
+</p:sld>
+</file>
+
+<file path=ppt/slides/slide13.xml><?xml version="1.0" encoding="utf-8"?>
+<p:sld xmlns:a="http://schemas.openxmlformats.org/drawingml/2006/main" xmlns:r="http://schemas.openxmlformats.org/officeDocument/2006/relationships" xmlns:p="http://schemas.openxmlformats.org/presentationml/2006/main">
+  <p:cSld>
+    <p:bg>
+      <p:bgPr>
+        <a:solidFill>
+          <a:schemeClr val="accent5">
+            <a:lumMod val="60000"/>
+            <a:lumOff val="40000"/>
+          </a:schemeClr>
+        </a:solidFill>
+        <a:effectLst/>
+      </p:bgPr>
+    </p:bg>
+    <p:spTree>
+      <p:nvGrpSpPr>
+        <p:cNvPr id="1" name=""/>
+        <p:cNvGrpSpPr/>
+        <p:nvPr/>
+      </p:nvGrpSpPr>
+      <p:grpSpPr>
+        <a:xfrm>
+          <a:off x="0" y="0"/>
+          <a:ext cx="0" cy="0"/>
+          <a:chOff x="0" y="0"/>
+          <a:chExt cx="0" cy="0"/>
+        </a:xfrm>
+      </p:grpSpPr>
+      <p:sp>
+        <p:nvSpPr>
+          <p:cNvPr id="9" name="Slide Number Placeholder 8"/>
+          <p:cNvSpPr>
+            <a:spLocks noGrp="1"/>
+          </p:cNvSpPr>
+          <p:nvPr>
+            <p:ph type="sldNum" sz="quarter" idx="12"/>
+          </p:nvPr>
+        </p:nvSpPr>
+        <p:spPr/>
+        <p:txBody>
+          <a:bodyPr/>
+          <a:lstStyle/>
+          <a:p>
+            <a:fld id="{B822FDE6-25CA-0444-94EE-C6FC8C5EFEB8}" type="slidenum">
+              <a:rPr lang="en-US" smtClean="0"/>
+              <a:t>13</a:t>
+            </a:fld>
+            <a:endParaRPr lang="en-US"/>
+          </a:p>
+        </p:txBody>
+      </p:sp>
+      <p:sp>
+        <p:nvSpPr>
+          <p:cNvPr id="6" name="Rectangle 5"/>
+          <p:cNvSpPr/>
+          <p:nvPr/>
+        </p:nvSpPr>
+        <p:spPr>
+          <a:xfrm>
+            <a:off x="0" y="1299607"/>
             <a:ext cx="12192000" cy="1646605"/>
           </a:xfrm>
           <a:prstGeom prst="rect">
@@ -5038,7 +5383,6 @@
               <a:rPr lang="en-US" sz="3800" b="1" dirty="0" smtClean="0"/>
               <a:t>Ruby</a:t>
             </a:r>
-            <a:endParaRPr lang="en-US" sz="3800" b="1" dirty="0" smtClean="0"/>
           </a:p>
           <a:p>
             <a:endParaRPr lang="en-US" sz="3800" b="1" dirty="0"/>
@@ -5050,7 +5394,7 @@
             </a:pPr>
             <a:r>
               <a:rPr lang="en-US" sz="2500" dirty="0" smtClean="0"/>
-              <a:t>Pointers</a:t>
+              <a:t>Answer the Ruby assignment preparation questions</a:t>
             </a:r>
           </a:p>
         </p:txBody>
@@ -5279,7 +5623,7 @@
               <a:rPr lang="en-US" smtClean="0"/>
               <a:t>3</a:t>
             </a:fld>
-            <a:endParaRPr lang="en-US"/>
+            <a:endParaRPr lang="en-US" dirty="0"/>
           </a:p>
         </p:txBody>
       </p:sp>
@@ -5292,7 +5636,7 @@
         <p:spPr>
           <a:xfrm>
             <a:off x="0" y="1299607"/>
-            <a:ext cx="12192000" cy="1646605"/>
+            <a:ext cx="12192000" cy="3647152"/>
           </a:xfrm>
           <a:prstGeom prst="rect">
             <a:avLst/>
@@ -5324,8 +5668,87 @@
             </a:pPr>
             <a:r>
               <a:rPr lang="en-US" sz="2500" dirty="0" smtClean="0"/>
-              <a:t>Pointers</a:t>
-            </a:r>
+              <a:t>Possible questions:</a:t>
+            </a:r>
+          </a:p>
+          <a:p>
+            <a:pPr marL="1943100" lvl="3" indent="-571500">
+              <a:buFont typeface="Arial" charset="0"/>
+              <a:buChar char="•"/>
+            </a:pPr>
+            <a:r>
+              <a:rPr lang="en-US" sz="2000" dirty="0" smtClean="0"/>
+              <a:t>In </a:t>
+            </a:r>
+            <a:r>
+              <a:rPr lang="en-US" sz="2000" dirty="0"/>
+              <a:t>pseudocode, describe how you would reverse a singly linked </a:t>
+            </a:r>
+            <a:r>
+              <a:rPr lang="en-US" sz="2000" dirty="0" smtClean="0"/>
+              <a:t>list</a:t>
+            </a:r>
+            <a:endParaRPr lang="en-US" sz="2000" dirty="0"/>
+          </a:p>
+          <a:p>
+            <a:pPr marL="1943100" lvl="3" indent="-571500">
+              <a:buFont typeface="Arial" charset="0"/>
+              <a:buChar char="•"/>
+            </a:pPr>
+            <a:r>
+              <a:rPr lang="en-US" sz="2000" dirty="0"/>
+              <a:t>In pseudocode, describe how you would you delete the middle item in a singly linked </a:t>
+            </a:r>
+            <a:r>
+              <a:rPr lang="en-US" sz="2000" dirty="0" smtClean="0"/>
+              <a:t>list</a:t>
+            </a:r>
+          </a:p>
+          <a:p>
+            <a:pPr marL="1943100" lvl="3" indent="-571500">
+              <a:buFont typeface="Arial" charset="0"/>
+              <a:buChar char="•"/>
+            </a:pPr>
+            <a:r>
+              <a:rPr lang="en-US" sz="2000" dirty="0"/>
+              <a:t>In pseudocode, describe how you would </a:t>
+            </a:r>
+            <a:r>
+              <a:rPr lang="en-US" sz="2000" dirty="0" smtClean="0"/>
+              <a:t>delete the last item in a </a:t>
+            </a:r>
+            <a:r>
+              <a:rPr lang="en-US" sz="2000" dirty="0"/>
+              <a:t>singly linked </a:t>
+            </a:r>
+            <a:r>
+              <a:rPr lang="en-US" sz="2000" dirty="0" smtClean="0"/>
+              <a:t>list</a:t>
+            </a:r>
+          </a:p>
+          <a:p>
+            <a:pPr marL="1943100" lvl="3" indent="-571500">
+              <a:buFont typeface="Arial" charset="0"/>
+              <a:buChar char="•"/>
+            </a:pPr>
+            <a:r>
+              <a:rPr lang="en-US" sz="2000" dirty="0" smtClean="0"/>
+              <a:t>In pseudocode, describe how you would insert an item at the tail of a singly linked list</a:t>
+            </a:r>
+          </a:p>
+          <a:p>
+            <a:pPr marL="1485900" lvl="2" indent="-571500">
+              <a:buFont typeface="Arial" charset="0"/>
+              <a:buChar char="•"/>
+            </a:pPr>
+            <a:endParaRPr lang="en-US" sz="2500" dirty="0"/>
+          </a:p>
+          <a:p>
+            <a:pPr marL="1485900" lvl="2" indent="-571500">
+              <a:buFont typeface="Arial" charset="0"/>
+              <a:buChar char="•"/>
+            </a:pPr>
+            <a:endParaRPr lang="en-US" sz="2500" dirty="0" smtClean="0"/>
           </a:p>
         </p:txBody>
       </p:sp>
@@ -5409,7 +5832,7 @@
         <p:spPr>
           <a:xfrm>
             <a:off x="0" y="1299607"/>
-            <a:ext cx="12192000" cy="1646605"/>
+            <a:ext cx="12192000" cy="2569934"/>
           </a:xfrm>
           <a:prstGeom prst="rect">
             <a:avLst/>
@@ -5441,11 +5864,71 @@
             </a:pPr>
             <a:r>
               <a:rPr lang="en-US" sz="2500" dirty="0" smtClean="0"/>
-              <a:t>Pointers</a:t>
-            </a:r>
-          </a:p>
-        </p:txBody>
-      </p:sp>
+              <a:t>How would you add the following facts?</a:t>
+            </a:r>
+          </a:p>
+          <a:p>
+            <a:pPr marL="1943100" lvl="3" indent="-571500">
+              <a:buFont typeface="Arial" charset="0"/>
+              <a:buChar char="•"/>
+            </a:pPr>
+            <a:r>
+              <a:rPr lang="en-US" sz="2000" dirty="0" smtClean="0"/>
+              <a:t>John likes anything that Mary likes</a:t>
+            </a:r>
+          </a:p>
+          <a:p>
+            <a:pPr marL="1943100" lvl="3" indent="-571500">
+              <a:buFont typeface="Arial" charset="0"/>
+              <a:buChar char="•"/>
+            </a:pPr>
+            <a:r>
+              <a:rPr lang="en-US" sz="2000" dirty="0" smtClean="0"/>
+              <a:t>John likes anyone who likes wines</a:t>
+            </a:r>
+          </a:p>
+          <a:p>
+            <a:pPr marL="1943100" lvl="3" indent="-571500">
+              <a:buFont typeface="Arial" charset="0"/>
+              <a:buChar char="•"/>
+            </a:pPr>
+            <a:r>
+              <a:rPr lang="en-US" sz="2000" dirty="0" smtClean="0"/>
+              <a:t>John likes anyone who likes themselves</a:t>
+            </a:r>
+          </a:p>
+        </p:txBody>
+      </p:sp>
+      <p:pic>
+        <p:nvPicPr>
+          <p:cNvPr id="2" name="Picture 1"/>
+          <p:cNvPicPr>
+            <a:picLocks noChangeAspect="1"/>
+          </p:cNvPicPr>
+          <p:nvPr/>
+        </p:nvPicPr>
+        <p:blipFill>
+          <a:blip r:embed="rId3">
+            <a:extLst>
+              <a:ext uri="{28A0092B-C50C-407E-A947-70E740481C1C}">
+                <a14:useLocalDpi xmlns:a14="http://schemas.microsoft.com/office/drawing/2010/main" val="0"/>
+              </a:ext>
+            </a:extLst>
+          </a:blip>
+          <a:stretch>
+            <a:fillRect/>
+          </a:stretch>
+        </p:blipFill>
+        <p:spPr>
+          <a:xfrm>
+            <a:off x="7868265" y="2189163"/>
+            <a:ext cx="2578100" cy="2552700"/>
+          </a:xfrm>
+          <a:prstGeom prst="rect">
+            <a:avLst/>
+          </a:prstGeom>
+        </p:spPr>
+      </p:pic>
     </p:spTree>
     <p:extLst>
       <p:ext uri="{BB962C8B-B14F-4D97-AF65-F5344CB8AC3E}">
@@ -5526,7 +6009,7 @@
         <p:spPr>
           <a:xfrm>
             <a:off x="0" y="1299607"/>
-            <a:ext cx="12192000" cy="1646605"/>
+            <a:ext cx="12192000" cy="4262705"/>
           </a:xfrm>
           <a:prstGeom prst="rect">
             <a:avLst/>
@@ -5545,7 +6028,7 @@
             </a:r>
             <a:r>
               <a:rPr lang="en-US" sz="3800" b="1" dirty="0" smtClean="0"/>
-              <a:t>Inheritance</a:t>
+              <a:t>Prolog</a:t>
             </a:r>
           </a:p>
           <a:p>
@@ -5557,16 +6040,171 @@
               <a:buChar char="•"/>
             </a:pPr>
             <a:r>
+              <a:rPr lang="en-US" sz="2500" dirty="0"/>
+              <a:t>How would you create the following queries?</a:t>
+            </a:r>
+          </a:p>
+          <a:p>
+            <a:pPr marL="1943100" lvl="3" indent="-571500">
+              <a:buFont typeface="Arial" charset="0"/>
+              <a:buChar char="•"/>
+            </a:pPr>
+            <a:r>
+              <a:rPr lang="en-US" sz="2000" dirty="0"/>
+              <a:t>Was George I the parent of Charles I? </a:t>
+            </a:r>
+          </a:p>
+          <a:p>
+            <a:pPr marL="1943100" lvl="3" indent="-571500">
+              <a:buFont typeface="Arial" charset="0"/>
+              <a:buChar char="•"/>
+            </a:pPr>
+            <a:r>
+              <a:rPr lang="en-US" sz="2000" dirty="0"/>
+              <a:t>Who was Charles I's parent? </a:t>
+            </a:r>
+          </a:p>
+          <a:p>
+            <a:pPr marL="1943100" lvl="3" indent="-571500">
+              <a:buFont typeface="Arial" charset="0"/>
+              <a:buChar char="•"/>
+            </a:pPr>
+            <a:r>
+              <a:rPr lang="en-US" sz="2000" dirty="0"/>
+              <a:t>Who were the children of Charles I</a:t>
+            </a:r>
+            <a:r>
+              <a:rPr lang="en-US" sz="2000" dirty="0" smtClean="0"/>
+              <a:t>?</a:t>
+            </a:r>
+          </a:p>
+          <a:p>
+            <a:pPr marL="1943100" lvl="3" indent="-571500">
+              <a:buFont typeface="+mj-lt"/>
+              <a:buAutoNum type="arabicPeriod"/>
+            </a:pPr>
+            <a:endParaRPr lang="en-US" sz="2500" dirty="0" smtClean="0"/>
+          </a:p>
+          <a:p>
+            <a:pPr marL="1485900" lvl="2" indent="-571500">
+              <a:buFont typeface="Arial" charset="0"/>
+              <a:buChar char="•"/>
+            </a:pPr>
+            <a:r>
               <a:rPr lang="en-US" sz="2500" dirty="0" smtClean="0"/>
-              <a:t>Pointers</a:t>
-            </a:r>
-          </a:p>
-        </p:txBody>
-      </p:sp>
+              <a:t>(Extra challenge) Express the following rules:</a:t>
+            </a:r>
+          </a:p>
+          <a:p>
+            <a:pPr marL="1943100" lvl="3" indent="-571500">
+              <a:buFont typeface="Arial" charset="0"/>
+              <a:buChar char="•"/>
+            </a:pPr>
+            <a:r>
+              <a:rPr lang="en-US" sz="2000" dirty="0"/>
+              <a:t>M is the mother of X if she is a parent of X and is female </a:t>
+            </a:r>
+            <a:endParaRPr lang="en-US" sz="2000" dirty="0" smtClean="0"/>
+          </a:p>
+          <a:p>
+            <a:pPr marL="1943100" lvl="3" indent="-571500">
+              <a:buFont typeface="Arial" charset="0"/>
+              <a:buChar char="•"/>
+            </a:pPr>
+            <a:r>
+              <a:rPr lang="en-US" sz="2000" dirty="0" smtClean="0"/>
+              <a:t>F </a:t>
+            </a:r>
+            <a:r>
+              <a:rPr lang="en-US" sz="2000" dirty="0"/>
+              <a:t>is the father of X if he is a parent of X and is male </a:t>
+            </a:r>
+            <a:endParaRPr lang="en-US" sz="2000" dirty="0" smtClean="0"/>
+          </a:p>
+          <a:p>
+            <a:pPr marL="1943100" lvl="3" indent="-571500">
+              <a:buFont typeface="Arial" charset="0"/>
+              <a:buChar char="•"/>
+            </a:pPr>
+            <a:r>
+              <a:rPr lang="en-US" sz="2000" dirty="0" smtClean="0"/>
+              <a:t>X </a:t>
+            </a:r>
+            <a:r>
+              <a:rPr lang="en-US" sz="2000" dirty="0"/>
+              <a:t>is a sibling of Y if they both have the same </a:t>
+            </a:r>
+            <a:r>
+              <a:rPr lang="en-US" sz="2000" dirty="0" smtClean="0"/>
+              <a:t>parent</a:t>
+            </a:r>
+          </a:p>
+        </p:txBody>
+      </p:sp>
+      <p:pic>
+        <p:nvPicPr>
+          <p:cNvPr id="2" name="Picture 1"/>
+          <p:cNvPicPr>
+            <a:picLocks noChangeAspect="1"/>
+          </p:cNvPicPr>
+          <p:nvPr/>
+        </p:nvPicPr>
+        <p:blipFill>
+          <a:blip r:embed="rId3">
+            <a:extLst>
+              <a:ext uri="{28A0092B-C50C-407E-A947-70E740481C1C}">
+                <a14:useLocalDpi xmlns:a14="http://schemas.microsoft.com/office/drawing/2010/main" val="0"/>
+              </a:ext>
+            </a:extLst>
+          </a:blip>
+          <a:stretch>
+            <a:fillRect/>
+          </a:stretch>
+        </p:blipFill>
+        <p:spPr>
+          <a:xfrm>
+            <a:off x="8610600" y="977789"/>
+            <a:ext cx="2555022" cy="2271917"/>
+          </a:xfrm>
+          <a:prstGeom prst="rect">
+            <a:avLst/>
+          </a:prstGeom>
+        </p:spPr>
+      </p:pic>
+      <p:pic>
+        <p:nvPicPr>
+          <p:cNvPr id="3" name="Picture 2"/>
+          <p:cNvPicPr>
+            <a:picLocks noChangeAspect="1"/>
+          </p:cNvPicPr>
+          <p:nvPr/>
+        </p:nvPicPr>
+        <p:blipFill>
+          <a:blip r:embed="rId4">
+            <a:extLst>
+              <a:ext uri="{28A0092B-C50C-407E-A947-70E740481C1C}">
+                <a14:useLocalDpi xmlns:a14="http://schemas.microsoft.com/office/drawing/2010/main" val="0"/>
+              </a:ext>
+            </a:extLst>
+          </a:blip>
+          <a:stretch>
+            <a:fillRect/>
+          </a:stretch>
+        </p:blipFill>
+        <p:spPr>
+          <a:xfrm>
+            <a:off x="9006419" y="3752900"/>
+            <a:ext cx="1763384" cy="2603450"/>
+          </a:xfrm>
+          <a:prstGeom prst="rect">
+            <a:avLst/>
+          </a:prstGeom>
+        </p:spPr>
+      </p:pic>
     </p:spTree>
     <p:extLst>
       <p:ext uri="{BB962C8B-B14F-4D97-AF65-F5344CB8AC3E}">
-        <p14:creationId xmlns:p14="http://schemas.microsoft.com/office/powerpoint/2010/main" val="843118793"/>
+        <p14:creationId xmlns:p14="http://schemas.microsoft.com/office/powerpoint/2010/main" val="1138123716"/>
       </p:ext>
     </p:extLst>
   </p:cSld>
@@ -5643,7 +6281,7 @@
         <p:spPr>
           <a:xfrm>
             <a:off x="0" y="1299607"/>
-            <a:ext cx="12192000" cy="1646605"/>
+            <a:ext cx="12192000" cy="2262158"/>
           </a:xfrm>
           <a:prstGeom prst="rect">
             <a:avLst/>
@@ -5662,7 +6300,7 @@
             </a:r>
             <a:r>
               <a:rPr lang="en-US" sz="3800" b="1" dirty="0" smtClean="0"/>
-              <a:t>Finite State Machine (FSM)</a:t>
+              <a:t>Inheritance</a:t>
             </a:r>
           </a:p>
           <a:p>
@@ -5675,15 +6313,30 @@
             </a:pPr>
             <a:r>
               <a:rPr lang="en-US" sz="2500" dirty="0" smtClean="0"/>
-              <a:t>Pointers</a:t>
-            </a:r>
+              <a:t>Draw a UML diagram showing inheritance for the following scenario:</a:t>
+            </a:r>
+          </a:p>
+          <a:p>
+            <a:pPr marL="1943100" lvl="3" indent="-571500">
+              <a:buFont typeface="Arial" charset="0"/>
+              <a:buChar char="•"/>
+            </a:pPr>
+            <a:r>
+              <a:rPr lang="en-AU" sz="2000" dirty="0"/>
+              <a:t>In a University, you have employees and students. Both employees and students have a name, age and sex. An employee has a salary, but a student has a loan, student id and </a:t>
+            </a:r>
+            <a:r>
+              <a:rPr lang="en-AU" sz="2000" dirty="0" smtClean="0"/>
+              <a:t>GPA</a:t>
+            </a:r>
+            <a:endParaRPr lang="en-US" sz="2000" dirty="0" smtClean="0"/>
           </a:p>
         </p:txBody>
       </p:sp>
     </p:spTree>
     <p:extLst>
       <p:ext uri="{BB962C8B-B14F-4D97-AF65-F5344CB8AC3E}">
-        <p14:creationId xmlns:p14="http://schemas.microsoft.com/office/powerpoint/2010/main" val="1372424303"/>
+        <p14:creationId xmlns:p14="http://schemas.microsoft.com/office/powerpoint/2010/main" val="843118793"/>
       </p:ext>
     </p:extLst>
   </p:cSld>
@@ -5760,7 +6413,7 @@
         <p:spPr>
           <a:xfrm>
             <a:off x="0" y="1299607"/>
-            <a:ext cx="12192000" cy="1646605"/>
+            <a:ext cx="12192000" cy="4724370"/>
           </a:xfrm>
           <a:prstGeom prst="rect">
             <a:avLst/>
@@ -5779,28 +6432,152 @@
             </a:r>
             <a:r>
               <a:rPr lang="en-US" sz="3800" b="1" dirty="0" smtClean="0"/>
-              <a:t>Optimization</a:t>
+              <a:t>Finite State Machine (FSM)</a:t>
             </a:r>
           </a:p>
           <a:p>
             <a:endParaRPr lang="en-US" sz="3800" b="1" dirty="0"/>
           </a:p>
           <a:p>
-            <a:pPr marL="1485900" lvl="2" indent="-571500">
+            <a:pPr lvl="2"/>
+            <a:r>
+              <a:rPr lang="en-US" sz="2500" dirty="0"/>
+              <a:t>When in the </a:t>
+            </a:r>
+            <a:r>
+              <a:rPr lang="en-US" sz="2500" b="1" dirty="0" smtClean="0"/>
+              <a:t>Move </a:t>
+            </a:r>
+            <a:r>
+              <a:rPr lang="en-US" sz="2500" dirty="0" smtClean="0"/>
+              <a:t>state</a:t>
+            </a:r>
+            <a:r>
+              <a:rPr lang="en-US" sz="2500" dirty="0"/>
+              <a:t>, the </a:t>
+            </a:r>
+            <a:r>
+              <a:rPr lang="en-US" sz="2500" dirty="0" smtClean="0"/>
+              <a:t>monster moves </a:t>
+            </a:r>
+            <a:r>
+              <a:rPr lang="en-US" sz="2500" dirty="0"/>
+              <a:t>in a constant direction </a:t>
+            </a:r>
+            <a:endParaRPr lang="en-US" sz="2500" dirty="0" smtClean="0"/>
+          </a:p>
+          <a:p>
+            <a:pPr lvl="2"/>
+            <a:r>
+              <a:rPr lang="en-US" sz="2500" dirty="0" smtClean="0"/>
+              <a:t>for </a:t>
+            </a:r>
+            <a:r>
+              <a:rPr lang="en-US" sz="2500" dirty="0"/>
+              <a:t>a fixed number of timer ticks, then selects a new random movement direction. </a:t>
+            </a:r>
+            <a:endParaRPr lang="en-US" sz="2500" dirty="0" smtClean="0"/>
+          </a:p>
+          <a:p>
+            <a:pPr lvl="2"/>
+            <a:r>
+              <a:rPr lang="en-US" sz="2500" dirty="0" smtClean="0"/>
+              <a:t>If </a:t>
+            </a:r>
+            <a:r>
+              <a:rPr lang="en-US" sz="2500" dirty="0"/>
+              <a:t>it encounters an obstacle, the </a:t>
+            </a:r>
+            <a:r>
+              <a:rPr lang="en-US" sz="2500" dirty="0" smtClean="0"/>
+              <a:t>monster backs </a:t>
+            </a:r>
+            <a:r>
+              <a:rPr lang="en-US" sz="2500" dirty="0"/>
+              <a:t>up a little, then moves into the </a:t>
+            </a:r>
+            <a:endParaRPr lang="en-US" sz="2500" dirty="0" smtClean="0"/>
+          </a:p>
+          <a:p>
+            <a:pPr lvl="2"/>
+            <a:r>
+              <a:rPr lang="en-US" sz="2500" b="1" dirty="0" smtClean="0"/>
+              <a:t>Change Direction </a:t>
+            </a:r>
+            <a:r>
+              <a:rPr lang="en-US" sz="2500" dirty="0" smtClean="0"/>
+              <a:t>state</a:t>
+            </a:r>
+            <a:r>
+              <a:rPr lang="en-US" sz="2500" dirty="0"/>
+              <a:t>, where it selects a new randomly chosen direction before returning to the </a:t>
+            </a:r>
+            <a:r>
+              <a:rPr lang="en-US" sz="2500" b="1" dirty="0" smtClean="0"/>
+              <a:t>Move </a:t>
+            </a:r>
+            <a:r>
+              <a:rPr lang="en-US" sz="2500" dirty="0" smtClean="0"/>
+              <a:t>state</a:t>
+            </a:r>
+            <a:r>
+              <a:rPr lang="en-US" sz="2500" dirty="0"/>
+              <a:t>. If it encounters food, it enters the </a:t>
+            </a:r>
+            <a:r>
+              <a:rPr lang="en-US" sz="2500" b="1" dirty="0" smtClean="0"/>
+              <a:t>Eat </a:t>
+            </a:r>
+            <a:r>
+              <a:rPr lang="en-US" sz="2500" dirty="0" smtClean="0"/>
+              <a:t>state</a:t>
+            </a:r>
+            <a:r>
+              <a:rPr lang="en-US" sz="2500" dirty="0"/>
+              <a:t>. After entering the </a:t>
+            </a:r>
+            <a:r>
+              <a:rPr lang="en-US" sz="2500" b="1" dirty="0" smtClean="0"/>
+              <a:t>Eat </a:t>
+            </a:r>
+            <a:r>
+              <a:rPr lang="en-US" sz="2500" dirty="0" smtClean="0"/>
+              <a:t>state</a:t>
+            </a:r>
+            <a:r>
+              <a:rPr lang="en-US" sz="2500" dirty="0"/>
+              <a:t>, the creature remains in that state for a fixed number of timer ticks. Its size then increases to allow the viewer to observe the effect of eating</a:t>
+            </a:r>
+            <a:r>
+              <a:rPr lang="en-US" sz="2500" dirty="0" smtClean="0"/>
+              <a:t>.</a:t>
+            </a:r>
+          </a:p>
+          <a:p>
+            <a:pPr lvl="2"/>
+            <a:endParaRPr lang="en-US" sz="2500" dirty="0"/>
+          </a:p>
+          <a:p>
+            <a:pPr marL="1257300" lvl="2" indent="-342900">
               <a:buFont typeface="Arial" charset="0"/>
               <a:buChar char="•"/>
             </a:pPr>
             <a:r>
+              <a:rPr lang="en-US" sz="2500" dirty="0"/>
+              <a:t>Sketch a Finite State Machine representing this </a:t>
+            </a:r>
+            <a:r>
               <a:rPr lang="en-US" sz="2500" dirty="0" smtClean="0"/>
-              <a:t>Pointers</a:t>
-            </a:r>
+              <a:t>AI</a:t>
+            </a:r>
+            <a:endParaRPr lang="en-GB" sz="2500" dirty="0"/>
           </a:p>
         </p:txBody>
       </p:sp>
     </p:spTree>
     <p:extLst>
       <p:ext uri="{BB962C8B-B14F-4D97-AF65-F5344CB8AC3E}">
-        <p14:creationId xmlns:p14="http://schemas.microsoft.com/office/powerpoint/2010/main" val="1827065741"/>
+        <p14:creationId xmlns:p14="http://schemas.microsoft.com/office/powerpoint/2010/main" val="1372424303"/>
       </p:ext>
     </p:extLst>
   </p:cSld>
@@ -5877,7 +6654,7 @@
         <p:spPr>
           <a:xfrm>
             <a:off x="0" y="1299607"/>
-            <a:ext cx="12192000" cy="1646605"/>
+            <a:ext cx="12192000" cy="2416046"/>
           </a:xfrm>
           <a:prstGeom prst="rect">
             <a:avLst/>
@@ -5909,11 +6686,59 @@
             </a:pPr>
             <a:r>
               <a:rPr lang="en-US" sz="2500" dirty="0" smtClean="0"/>
-              <a:t>Pointers</a:t>
-            </a:r>
-          </a:p>
-        </p:txBody>
-      </p:sp>
+              <a:t>Simplify imperative code into a list comprehension</a:t>
+            </a:r>
+          </a:p>
+          <a:p>
+            <a:pPr marL="1485900" lvl="2" indent="-571500">
+              <a:buFont typeface="Arial" charset="0"/>
+              <a:buChar char="•"/>
+            </a:pPr>
+            <a:r>
+              <a:rPr lang="en-US" sz="2500" dirty="0" smtClean="0"/>
+              <a:t>Write a list comprehension that uses </a:t>
+            </a:r>
+            <a:r>
+              <a:rPr lang="en-US" sz="2500" b="1" i="1" dirty="0" smtClean="0"/>
+              <a:t>double(x) </a:t>
+            </a:r>
+            <a:r>
+              <a:rPr lang="en-US" sz="2500" dirty="0" smtClean="0"/>
+              <a:t> to generate numbers between 0-20 and returns a list of odd numbers</a:t>
+            </a:r>
+          </a:p>
+        </p:txBody>
+      </p:sp>
+      <p:pic>
+        <p:nvPicPr>
+          <p:cNvPr id="2" name="Picture 1"/>
+          <p:cNvPicPr>
+            <a:picLocks noChangeAspect="1"/>
+          </p:cNvPicPr>
+          <p:nvPr/>
+        </p:nvPicPr>
+        <p:blipFill>
+          <a:blip r:embed="rId3">
+            <a:extLst>
+              <a:ext uri="{28A0092B-C50C-407E-A947-70E740481C1C}">
+                <a14:useLocalDpi xmlns:a14="http://schemas.microsoft.com/office/drawing/2010/main" val="0"/>
+              </a:ext>
+            </a:extLst>
+          </a:blip>
+          <a:stretch>
+            <a:fillRect/>
+          </a:stretch>
+        </p:blipFill>
+        <p:spPr>
+          <a:xfrm>
+            <a:off x="4538306" y="4409215"/>
+            <a:ext cx="3042364" cy="964129"/>
+          </a:xfrm>
+          <a:prstGeom prst="rect">
+            <a:avLst/>
+          </a:prstGeom>
+        </p:spPr>
+      </p:pic>
     </p:spTree>
     <p:extLst>
       <p:ext uri="{BB962C8B-B14F-4D97-AF65-F5344CB8AC3E}">
@@ -5994,7 +6819,7 @@
         <p:spPr>
           <a:xfrm>
             <a:off x="0" y="1299607"/>
-            <a:ext cx="12192000" cy="1646605"/>
+            <a:ext cx="12192000" cy="2416046"/>
           </a:xfrm>
           <a:prstGeom prst="rect">
             <a:avLst/>
@@ -6026,11 +6851,51 @@
             </a:pPr>
             <a:r>
               <a:rPr lang="en-US" sz="2500" dirty="0" smtClean="0"/>
-              <a:t>Pointers</a:t>
-            </a:r>
-          </a:p>
-        </p:txBody>
-      </p:sp>
+              <a:t>Simplify imperative code into a lambda expression </a:t>
+            </a:r>
+          </a:p>
+          <a:p>
+            <a:pPr marL="1485900" lvl="2" indent="-571500">
+              <a:buFont typeface="Arial" charset="0"/>
+              <a:buChar char="•"/>
+            </a:pPr>
+            <a:r>
+              <a:rPr lang="en-US" sz="2500" dirty="0" smtClean="0"/>
+              <a:t>Write a map and lambda function that adds two list of numbers together and returns a single list of numbers</a:t>
+            </a:r>
+          </a:p>
+        </p:txBody>
+      </p:sp>
+      <p:pic>
+        <p:nvPicPr>
+          <p:cNvPr id="2" name="Picture 1"/>
+          <p:cNvPicPr>
+            <a:picLocks noChangeAspect="1"/>
+          </p:cNvPicPr>
+          <p:nvPr/>
+        </p:nvPicPr>
+        <p:blipFill>
+          <a:blip r:embed="rId3">
+            <a:extLst>
+              <a:ext uri="{28A0092B-C50C-407E-A947-70E740481C1C}">
+                <a14:useLocalDpi xmlns:a14="http://schemas.microsoft.com/office/drawing/2010/main" val="0"/>
+              </a:ext>
+            </a:extLst>
+          </a:blip>
+          <a:stretch>
+            <a:fillRect/>
+          </a:stretch>
+        </p:blipFill>
+        <p:spPr>
+          <a:xfrm>
+            <a:off x="4002575" y="3991614"/>
+            <a:ext cx="4113825" cy="1704053"/>
+          </a:xfrm>
+          <a:prstGeom prst="rect">
+            <a:avLst/>
+          </a:prstGeom>
+        </p:spPr>
+      </p:pic>
     </p:spTree>
     <p:extLst>
       <p:ext uri="{BB962C8B-B14F-4D97-AF65-F5344CB8AC3E}">

</xml_diff>

<commit_message>
Update exam-prep.py for Programming 4
</commit_message>
<xml_diff>
--- a/Programming 4/Exam Preparation/Exam Preparation.pptx
+++ b/Programming 4/Exam Preparation/Exam Preparation.pptx
@@ -5192,7 +5192,7 @@
         <p:spPr>
           <a:xfrm>
             <a:off x="0" y="1299607"/>
-            <a:ext cx="12192000" cy="2877711"/>
+            <a:ext cx="12192000" cy="3185487"/>
           </a:xfrm>
           <a:prstGeom prst="rect">
             <a:avLst/>
@@ -5266,6 +5266,17 @@
               <a:rPr lang="en-US" sz="2000" dirty="0" smtClean="0"/>
               <a:t>NotImplementedException</a:t>
             </a:r>
+          </a:p>
+          <a:p>
+            <a:pPr marL="1943100" lvl="3" indent="-571500">
+              <a:buFont typeface="Arial" charset="0"/>
+              <a:buChar char="•"/>
+            </a:pPr>
+            <a:r>
+              <a:rPr lang="en-US" sz="2000" dirty="0" smtClean="0"/>
+              <a:t>NullReferenceException</a:t>
+            </a:r>
+            <a:endParaRPr lang="en-US" sz="2000" dirty="0" smtClean="0"/>
           </a:p>
         </p:txBody>
       </p:sp>
@@ -5853,7 +5864,6 @@
               <a:rPr lang="en-US" sz="2500" dirty="0" smtClean="0"/>
               <a:t>What are the results of the following queries?</a:t>
             </a:r>
-            <a:endParaRPr lang="en-US" sz="2500" dirty="0" smtClean="0"/>
           </a:p>
           <a:p>
             <a:pPr marL="1943100" lvl="3" indent="-571500">
@@ -5864,7 +5874,6 @@
               <a:rPr lang="en-US" sz="2000" dirty="0" smtClean="0"/>
               <a:t>Does Mary like food?</a:t>
             </a:r>
-            <a:endParaRPr lang="en-US" sz="2000" dirty="0" smtClean="0"/>
           </a:p>
           <a:p>
             <a:pPr marL="1943100" lvl="3" indent="-571500">
@@ -5875,7 +5884,6 @@
               <a:rPr lang="en-US" sz="2000" dirty="0" smtClean="0"/>
               <a:t>Does John like wine?</a:t>
             </a:r>
-            <a:endParaRPr lang="en-US" sz="2000" dirty="0" smtClean="0"/>
           </a:p>
           <a:p>
             <a:pPr marL="1943100" lvl="3" indent="-571500">
@@ -5886,7 +5894,6 @@
               <a:rPr lang="en-US" sz="2000" dirty="0" smtClean="0"/>
               <a:t>Does John like food?</a:t>
             </a:r>
-            <a:endParaRPr lang="en-US" sz="2000" dirty="0" smtClean="0"/>
           </a:p>
         </p:txBody>
       </p:sp>

</xml_diff>

<commit_message>
Update Prog 4 PP and add answers to PP questions
</commit_message>
<xml_diff>
--- a/Programming 4/Exam Preparation/Exam Preparation.pptx
+++ b/Programming 4/Exam Preparation/Exam Preparation.pptx
@@ -5276,7 +5276,6 @@
               <a:rPr lang="en-US" sz="2000" dirty="0" smtClean="0"/>
               <a:t>NullReferenceException</a:t>
             </a:r>
-            <a:endParaRPr lang="en-US" sz="2000" dirty="0" smtClean="0"/>
           </a:p>
         </p:txBody>
       </p:sp>
@@ -6692,17 +6691,22 @@
               <a:buChar char="•"/>
             </a:pPr>
             <a:r>
-              <a:rPr lang="en-US" sz="2500" dirty="0" smtClean="0"/>
-              <a:t>Write a list comprehension that uses </a:t>
-            </a:r>
-            <a:r>
-              <a:rPr lang="en-US" sz="2500" b="1" i="1" dirty="0" smtClean="0"/>
-              <a:t>double(x) </a:t>
-            </a:r>
-            <a:r>
-              <a:rPr lang="en-US" sz="2500" dirty="0" smtClean="0"/>
-              <a:t> to generate numbers between 0-20 and returns a list of odd numbers</a:t>
-            </a:r>
+              <a:rPr lang="en-US" sz="2500" dirty="0"/>
+              <a:t>Write a list comprehension that uses double(x) to generate numbers between 0-20 and returns the following list </a:t>
+            </a:r>
+            <a:r>
+              <a:rPr lang="en-US" sz="2500"/>
+              <a:t>of </a:t>
+            </a:r>
+            <a:r>
+              <a:rPr lang="en-US" sz="2500" smtClean="0"/>
+              <a:t>numbers; </a:t>
+            </a:r>
+            <a:r>
+              <a:rPr lang="cs-CZ" sz="2500" dirty="0"/>
+              <a:t>[2, 6, 10, 14, 18, 22, 26, 30, 34, 38]</a:t>
+            </a:r>
+            <a:endParaRPr lang="en-US" sz="2500" dirty="0"/>
           </a:p>
         </p:txBody>
       </p:sp>

</xml_diff>